<commit_message>
update slides for day 2
</commit_message>
<xml_diff>
--- a/_files/day-2-topics.pptx
+++ b/_files/day-2-topics.pptx
@@ -238,7 +238,7 @@
               <a:rPr lang="en-US" smtClean="0">
                 <a:latin typeface="Lucida Grande Regular" panose="020B0600040502020204" pitchFamily="34" charset="0"/>
               </a:rPr>
-              <a:t>8/9/21</a:t>
+              <a:t>8/1/2023</a:t>
             </a:fld>
             <a:endParaRPr lang="en-US" dirty="0">
               <a:latin typeface="Lucida Grande Regular" panose="020B0600040502020204" pitchFamily="34" charset="0"/>
@@ -417,7 +417,7 @@
             <a:fld id="{5F53F6BF-7462-9046-A2B6-90C29244BD27}" type="datetimeFigureOut">
               <a:rPr lang="en-US" smtClean="0"/>
               <a:pPr/>
-              <a:t>8/9/21</a:t>
+              <a:t>8/1/2023</a:t>
             </a:fld>
             <a:endParaRPr lang="en-US" dirty="0"/>
           </a:p>
@@ -4232,12 +4232,8 @@
           <a:lstStyle/>
           <a:p>
             <a:r>
-              <a:rPr lang="en-US"/>
-              <a:t>Day 2 </a:t>
-            </a:r>
-            <a:r>
               <a:rPr lang="en-US" dirty="0"/>
-              <a:t>Topics</a:t>
+              <a:t>Day 2 Topics</a:t>
             </a:r>
           </a:p>
         </p:txBody>
@@ -4280,6 +4276,20 @@
           <a:p>
             <a:r>
               <a:rPr lang="en-US" sz="2400" dirty="0"/>
+              <a:t>Discuss </a:t>
+            </a:r>
+            <a:r>
+              <a:rPr lang="en-US" sz="2400" dirty="0" err="1"/>
+              <a:t>conda</a:t>
+            </a:r>
+            <a:r>
+              <a:rPr lang="en-US" sz="2400" dirty="0"/>
+              <a:t> environments and commands.</a:t>
+            </a:r>
+          </a:p>
+          <a:p>
+            <a:r>
+              <a:rPr lang="en-US" sz="2400" dirty="0"/>
               <a:t>Define how to perform a Monte Carlo Integration.</a:t>
             </a:r>
           </a:p>
@@ -4299,12 +4309,6 @@
             <a:r>
               <a:rPr lang="en-US" sz="2400" dirty="0"/>
               <a:t>Write a function to compute the Lennard Jones potential energy.</a:t>
-            </a:r>
-          </a:p>
-          <a:p>
-            <a:r>
-              <a:rPr lang="en-US" sz="2400" dirty="0"/>
-              <a:t>Compute the energy of a system of particles using the Lennard Jones potential energy function.</a:t>
             </a:r>
           </a:p>
         </p:txBody>

</xml_diff>